<commit_message>
Update speaker notes slides layout
</commit_message>
<xml_diff>
--- a/Docker on Windows 101 - Speaker Notes.pptx
+++ b/Docker on Windows 101 - Speaker Notes.pptx
@@ -198,7 +198,7 @@
           <a:p>
             <a:fld id="{CE488D6F-BE01-41DD-B246-4F519A9F2485}" type="datetimeFigureOut">
               <a:rPr lang="en-GB" smtClean="0"/>
-              <a:t>07/05/2018</a:t>
+              <a:t>10/05/2018</a:t>
             </a:fld>
             <a:endParaRPr lang="en-GB"/>
           </a:p>
@@ -412,7 +412,7 @@
           <a:p>
             <a:fld id="{EB096188-5E5B-4D7B-A9FC-106A9AC4C769}" type="datetimeFigureOut">
               <a:rPr lang="en-GB" smtClean="0"/>
-              <a:t>07/05/2018</a:t>
+              <a:t>10/05/2018</a:t>
             </a:fld>
             <a:endParaRPr lang="en-GB"/>
           </a:p>
@@ -582,7 +582,7 @@
           <a:p>
             <a:fld id="{EB096188-5E5B-4D7B-A9FC-106A9AC4C769}" type="datetimeFigureOut">
               <a:rPr lang="en-GB" smtClean="0"/>
-              <a:t>07/05/2018</a:t>
+              <a:t>10/05/2018</a:t>
             </a:fld>
             <a:endParaRPr lang="en-GB"/>
           </a:p>
@@ -762,7 +762,7 @@
           <a:p>
             <a:fld id="{EB096188-5E5B-4D7B-A9FC-106A9AC4C769}" type="datetimeFigureOut">
               <a:rPr lang="en-GB" smtClean="0"/>
-              <a:t>07/05/2018</a:t>
+              <a:t>10/05/2018</a:t>
             </a:fld>
             <a:endParaRPr lang="en-GB"/>
           </a:p>
@@ -932,7 +932,7 @@
           <a:p>
             <a:fld id="{EB096188-5E5B-4D7B-A9FC-106A9AC4C769}" type="datetimeFigureOut">
               <a:rPr lang="en-GB" smtClean="0"/>
-              <a:t>07/05/2018</a:t>
+              <a:t>10/05/2018</a:t>
             </a:fld>
             <a:endParaRPr lang="en-GB"/>
           </a:p>
@@ -1178,7 +1178,7 @@
           <a:p>
             <a:fld id="{EB096188-5E5B-4D7B-A9FC-106A9AC4C769}" type="datetimeFigureOut">
               <a:rPr lang="en-GB" smtClean="0"/>
-              <a:t>07/05/2018</a:t>
+              <a:t>10/05/2018</a:t>
             </a:fld>
             <a:endParaRPr lang="en-GB"/>
           </a:p>
@@ -1410,7 +1410,7 @@
           <a:p>
             <a:fld id="{EB096188-5E5B-4D7B-A9FC-106A9AC4C769}" type="datetimeFigureOut">
               <a:rPr lang="en-GB" smtClean="0"/>
-              <a:t>07/05/2018</a:t>
+              <a:t>10/05/2018</a:t>
             </a:fld>
             <a:endParaRPr lang="en-GB"/>
           </a:p>
@@ -1777,7 +1777,7 @@
           <a:p>
             <a:fld id="{EB096188-5E5B-4D7B-A9FC-106A9AC4C769}" type="datetimeFigureOut">
               <a:rPr lang="en-GB" smtClean="0"/>
-              <a:t>07/05/2018</a:t>
+              <a:t>10/05/2018</a:t>
             </a:fld>
             <a:endParaRPr lang="en-GB"/>
           </a:p>
@@ -1895,7 +1895,7 @@
           <a:p>
             <a:fld id="{EB096188-5E5B-4D7B-A9FC-106A9AC4C769}" type="datetimeFigureOut">
               <a:rPr lang="en-GB" smtClean="0"/>
-              <a:t>07/05/2018</a:t>
+              <a:t>10/05/2018</a:t>
             </a:fld>
             <a:endParaRPr lang="en-GB"/>
           </a:p>
@@ -1990,7 +1990,7 @@
           <a:p>
             <a:fld id="{EB096188-5E5B-4D7B-A9FC-106A9AC4C769}" type="datetimeFigureOut">
               <a:rPr lang="en-GB" smtClean="0"/>
-              <a:t>07/05/2018</a:t>
+              <a:t>10/05/2018</a:t>
             </a:fld>
             <a:endParaRPr lang="en-GB"/>
           </a:p>
@@ -2267,7 +2267,7 @@
           <a:p>
             <a:fld id="{EB096188-5E5B-4D7B-A9FC-106A9AC4C769}" type="datetimeFigureOut">
               <a:rPr lang="en-GB" smtClean="0"/>
-              <a:t>07/05/2018</a:t>
+              <a:t>10/05/2018</a:t>
             </a:fld>
             <a:endParaRPr lang="en-GB"/>
           </a:p>
@@ -2520,7 +2520,7 @@
           <a:p>
             <a:fld id="{EB096188-5E5B-4D7B-A9FC-106A9AC4C769}" type="datetimeFigureOut">
               <a:rPr lang="en-GB" smtClean="0"/>
-              <a:t>07/05/2018</a:t>
+              <a:t>10/05/2018</a:t>
             </a:fld>
             <a:endParaRPr lang="en-GB"/>
           </a:p>
@@ -2733,7 +2733,7 @@
           <a:p>
             <a:fld id="{EB096188-5E5B-4D7B-A9FC-106A9AC4C769}" type="datetimeFigureOut">
               <a:rPr lang="en-GB" smtClean="0"/>
-              <a:t>07/05/2018</a:t>
+              <a:t>10/05/2018</a:t>
             </a:fld>
             <a:endParaRPr lang="en-GB"/>
           </a:p>
@@ -3146,7 +3146,7 @@
         </p:nvSpPr>
         <p:spPr>
           <a:xfrm>
-            <a:off x="520460" y="284484"/>
+            <a:off x="5817079" y="301736"/>
             <a:ext cx="6915510" cy="6189515"/>
           </a:xfrm>
           <a:prstGeom prst="rect">
@@ -3436,15 +3436,7 @@
                 <a:ea typeface="Calibri" panose="020F0502020204030204" pitchFamily="34" charset="0"/>
                 <a:cs typeface="Times New Roman" panose="02020603050405020304" pitchFamily="18" charset="0"/>
               </a:rPr>
-              <a:t> </a:t>
-            </a:r>
-            <a:r>
-              <a:rPr lang="en-GB" sz="2800" dirty="0" smtClean="0">
-                <a:latin typeface="Calibri" panose="020F0502020204030204" pitchFamily="34" charset="0"/>
-                <a:ea typeface="Calibri" panose="020F0502020204030204" pitchFamily="34" charset="0"/>
-                <a:cs typeface="Times New Roman" panose="02020603050405020304" pitchFamily="18" charset="0"/>
-              </a:rPr>
-              <a:t>logs *CONTAINER ID*</a:t>
+              <a:t> logs *CONTAINER ID*</a:t>
             </a:r>
             <a:endParaRPr lang="en-GB" sz="2800" dirty="0" smtClean="0">
               <a:effectLst/>
@@ -3629,8 +3621,8 @@
         </p:nvSpPr>
         <p:spPr>
           <a:xfrm>
-            <a:off x="198408" y="86076"/>
-            <a:ext cx="10524226" cy="8171211"/>
+            <a:off x="5882054" y="0"/>
+            <a:ext cx="7101530" cy="8171211"/>
           </a:xfrm>
           <a:prstGeom prst="rect">
             <a:avLst/>
@@ -3999,7 +3991,7 @@
         </p:nvSpPr>
         <p:spPr>
           <a:xfrm>
-            <a:off x="6711351" y="4718649"/>
+            <a:off x="286496" y="4903121"/>
             <a:ext cx="5302922" cy="1600438"/>
           </a:xfrm>
           <a:prstGeom prst="rect">

</xml_diff>